<commit_message>
finished medical facility slides
</commit_message>
<xml_diff>
--- a/PowerPoints/Phase 3 - Claims Terminology/017 Medical Facilities.pptx
+++ b/PowerPoints/Phase 3 - Claims Terminology/017 Medical Facilities.pptx
@@ -260,7 +260,7 @@
           <a:p>
             <a:fld id="{FF632088-7E42-4B13-8645-6CA4616862AF}" type="datetimeFigureOut">
               <a:rPr lang="en-US" smtClean="0"/>
-              <a:t>3/2/2016</a:t>
+              <a:t>3/3/2016</a:t>
             </a:fld>
             <a:endParaRPr lang="en-US"/>
           </a:p>
@@ -430,7 +430,7 @@
           <a:p>
             <a:fld id="{FF632088-7E42-4B13-8645-6CA4616862AF}" type="datetimeFigureOut">
               <a:rPr lang="en-US" smtClean="0"/>
-              <a:t>3/2/2016</a:t>
+              <a:t>3/3/2016</a:t>
             </a:fld>
             <a:endParaRPr lang="en-US"/>
           </a:p>
@@ -610,7 +610,7 @@
           <a:p>
             <a:fld id="{FF632088-7E42-4B13-8645-6CA4616862AF}" type="datetimeFigureOut">
               <a:rPr lang="en-US" smtClean="0"/>
-              <a:t>3/2/2016</a:t>
+              <a:t>3/3/2016</a:t>
             </a:fld>
             <a:endParaRPr lang="en-US"/>
           </a:p>
@@ -810,7 +810,7 @@
           <a:p>
             <a:fld id="{FF632088-7E42-4B13-8645-6CA4616862AF}" type="datetimeFigureOut">
               <a:rPr lang="en-US" smtClean="0"/>
-              <a:t>3/2/2016</a:t>
+              <a:t>3/3/2016</a:t>
             </a:fld>
             <a:endParaRPr lang="en-US"/>
           </a:p>
@@ -1027,7 +1027,7 @@
           <a:p>
             <a:fld id="{FF632088-7E42-4B13-8645-6CA4616862AF}" type="datetimeFigureOut">
               <a:rPr lang="en-US" smtClean="0"/>
-              <a:t>3/2/2016</a:t>
+              <a:t>3/3/2016</a:t>
             </a:fld>
             <a:endParaRPr lang="en-US"/>
           </a:p>
@@ -1312,7 +1312,7 @@
           <a:p>
             <a:fld id="{FF632088-7E42-4B13-8645-6CA4616862AF}" type="datetimeFigureOut">
               <a:rPr lang="en-US" smtClean="0"/>
-              <a:t>3/2/2016</a:t>
+              <a:t>3/3/2016</a:t>
             </a:fld>
             <a:endParaRPr lang="en-US"/>
           </a:p>
@@ -1586,7 +1586,7 @@
           <a:p>
             <a:fld id="{FF632088-7E42-4B13-8645-6CA4616862AF}" type="datetimeFigureOut">
               <a:rPr lang="en-US" smtClean="0"/>
-              <a:t>3/2/2016</a:t>
+              <a:t>3/3/2016</a:t>
             </a:fld>
             <a:endParaRPr lang="en-US"/>
           </a:p>
@@ -1683,7 +1683,7 @@
   </p:clrMapOvr>
   <p:extLst>
     <p:ext uri="{DCECCB84-F9BA-43D5-87BE-67443E8EF086}">
-      <p15:sldGuideLst xmlns:p15="http://schemas.microsoft.com/office/powerpoint/2012/main" xmlns=""/>
+      <p15:sldGuideLst xmlns="" xmlns:p15="http://schemas.microsoft.com/office/powerpoint/2012/main"/>
     </p:ext>
   </p:extLst>
 </p:sldLayout>
@@ -2013,7 +2013,7 @@
           <a:p>
             <a:fld id="{FF632088-7E42-4B13-8645-6CA4616862AF}" type="datetimeFigureOut">
               <a:rPr lang="en-US" smtClean="0"/>
-              <a:t>3/2/2016</a:t>
+              <a:t>3/3/2016</a:t>
             </a:fld>
             <a:endParaRPr lang="en-US"/>
           </a:p>
@@ -2110,7 +2110,7 @@
   </p:clrMapOvr>
   <p:extLst>
     <p:ext uri="{DCECCB84-F9BA-43D5-87BE-67443E8EF086}">
-      <p15:sldGuideLst xmlns:p15="http://schemas.microsoft.com/office/powerpoint/2012/main" xmlns=""/>
+      <p15:sldGuideLst xmlns="" xmlns:p15="http://schemas.microsoft.com/office/powerpoint/2012/main"/>
     </p:ext>
   </p:extLst>
 </p:sldLayout>
@@ -2173,7 +2173,7 @@
           <a:p>
             <a:fld id="{FF632088-7E42-4B13-8645-6CA4616862AF}" type="datetimeFigureOut">
               <a:rPr lang="en-US" smtClean="0"/>
-              <a:t>3/2/2016</a:t>
+              <a:t>3/3/2016</a:t>
             </a:fld>
             <a:endParaRPr lang="en-US"/>
           </a:p>
@@ -2305,7 +2305,7 @@
           <a:p>
             <a:fld id="{FF632088-7E42-4B13-8645-6CA4616862AF}" type="datetimeFigureOut">
               <a:rPr lang="en-US" smtClean="0"/>
-              <a:t>3/2/2016</a:t>
+              <a:t>3/3/2016</a:t>
             </a:fld>
             <a:endParaRPr lang="en-US"/>
           </a:p>
@@ -2556,7 +2556,7 @@
           <a:p>
             <a:fld id="{FF632088-7E42-4B13-8645-6CA4616862AF}" type="datetimeFigureOut">
               <a:rPr lang="en-US" smtClean="0"/>
-              <a:t>3/2/2016</a:t>
+              <a:t>3/3/2016</a:t>
             </a:fld>
             <a:endParaRPr lang="en-US"/>
           </a:p>
@@ -2653,7 +2653,7 @@
   </p:clrMapOvr>
   <p:extLst>
     <p:ext uri="{DCECCB84-F9BA-43D5-87BE-67443E8EF086}">
-      <p15:sldGuideLst xmlns:p15="http://schemas.microsoft.com/office/powerpoint/2012/main" xmlns=""/>
+      <p15:sldGuideLst xmlns="" xmlns:p15="http://schemas.microsoft.com/office/powerpoint/2012/main"/>
     </p:ext>
   </p:extLst>
 </p:sldLayout>
@@ -2768,7 +2768,7 @@
           <a:p>
             <a:fld id="{FF632088-7E42-4B13-8645-6CA4616862AF}" type="datetimeFigureOut">
               <a:rPr lang="en-US" smtClean="0"/>
-              <a:t>3/2/2016</a:t>
+              <a:t>3/3/2016</a:t>
             </a:fld>
             <a:endParaRPr lang="en-US"/>
           </a:p>
@@ -3186,7 +3186,7 @@
           <a:p>
             <a:fld id="{FF632088-7E42-4B13-8645-6CA4616862AF}" type="datetimeFigureOut">
               <a:rPr lang="en-US" smtClean="0"/>
-              <a:t>3/2/2016</a:t>
+              <a:t>3/3/2016</a:t>
             </a:fld>
             <a:endParaRPr lang="en-US"/>
           </a:p>
@@ -3398,7 +3398,7 @@
           <a:p>
             <a:fld id="{FF632088-7E42-4B13-8645-6CA4616862AF}" type="datetimeFigureOut">
               <a:rPr lang="en-US" smtClean="0"/>
-              <a:t>3/2/2016</a:t>
+              <a:t>3/3/2016</a:t>
             </a:fld>
             <a:endParaRPr lang="en-US"/>
           </a:p>
@@ -3619,7 +3619,7 @@
           <a:p>
             <a:fld id="{FF632088-7E42-4B13-8645-6CA4616862AF}" type="datetimeFigureOut">
               <a:rPr lang="en-US" smtClean="0"/>
-              <a:t>3/2/2016</a:t>
+              <a:t>3/3/2016</a:t>
             </a:fld>
             <a:endParaRPr lang="en-US"/>
           </a:p>
@@ -3907,7 +3907,7 @@
           <a:p>
             <a:fld id="{FF632088-7E42-4B13-8645-6CA4616862AF}" type="datetimeFigureOut">
               <a:rPr lang="en-US" smtClean="0"/>
-              <a:t>3/2/2016</a:t>
+              <a:t>3/3/2016</a:t>
             </a:fld>
             <a:endParaRPr lang="en-US"/>
           </a:p>
@@ -4139,7 +4139,7 @@
           <a:p>
             <a:fld id="{FF632088-7E42-4B13-8645-6CA4616862AF}" type="datetimeFigureOut">
               <a:rPr lang="en-US" smtClean="0"/>
-              <a:t>3/2/2016</a:t>
+              <a:t>3/3/2016</a:t>
             </a:fld>
             <a:endParaRPr lang="en-US"/>
           </a:p>
@@ -4199,7 +4199,7 @@
   </p:clrMapOvr>
   <p:extLst>
     <p:ext uri="{DCECCB84-F9BA-43D5-87BE-67443E8EF086}">
-      <p15:sldGuideLst xmlns:p15="http://schemas.microsoft.com/office/powerpoint/2012/main" xmlns=""/>
+      <p15:sldGuideLst xmlns="" xmlns:p15="http://schemas.microsoft.com/office/powerpoint/2012/main"/>
     </p:ext>
   </p:extLst>
 </p:sldLayout>
@@ -4491,7 +4491,7 @@
           <a:p>
             <a:fld id="{FF632088-7E42-4B13-8645-6CA4616862AF}" type="datetimeFigureOut">
               <a:rPr lang="en-US" smtClean="0"/>
-              <a:t>3/2/2016</a:t>
+              <a:t>3/3/2016</a:t>
             </a:fld>
             <a:endParaRPr lang="en-US"/>
           </a:p>
@@ -4574,7 +4574,7 @@
   </p:clrMapOvr>
   <p:extLst>
     <p:ext uri="{DCECCB84-F9BA-43D5-87BE-67443E8EF086}">
-      <p15:sldGuideLst xmlns:p15="http://schemas.microsoft.com/office/powerpoint/2012/main" xmlns=""/>
+      <p15:sldGuideLst xmlns="" xmlns:p15="http://schemas.microsoft.com/office/powerpoint/2012/main"/>
     </p:ext>
   </p:extLst>
 </p:sldLayout>
@@ -4614,7 +4614,7 @@
           <a:p>
             <a:fld id="{FF632088-7E42-4B13-8645-6CA4616862AF}" type="datetimeFigureOut">
               <a:rPr lang="en-US" smtClean="0"/>
-              <a:t>3/2/2016</a:t>
+              <a:t>3/3/2016</a:t>
             </a:fld>
             <a:endParaRPr lang="en-US"/>
           </a:p>
@@ -4732,7 +4732,7 @@
           <a:p>
             <a:fld id="{FF632088-7E42-4B13-8645-6CA4616862AF}" type="datetimeFigureOut">
               <a:rPr lang="en-US" smtClean="0"/>
-              <a:t>3/2/2016</a:t>
+              <a:t>3/3/2016</a:t>
             </a:fld>
             <a:endParaRPr lang="en-US"/>
           </a:p>
@@ -5016,7 +5016,7 @@
           <a:p>
             <a:fld id="{FF632088-7E42-4B13-8645-6CA4616862AF}" type="datetimeFigureOut">
               <a:rPr lang="en-US" smtClean="0"/>
-              <a:t>3/2/2016</a:t>
+              <a:t>3/3/2016</a:t>
             </a:fld>
             <a:endParaRPr lang="en-US"/>
           </a:p>
@@ -5076,7 +5076,7 @@
   </p:clrMapOvr>
   <p:extLst>
     <p:ext uri="{DCECCB84-F9BA-43D5-87BE-67443E8EF086}">
-      <p15:sldGuideLst xmlns:p15="http://schemas.microsoft.com/office/powerpoint/2012/main" xmlns=""/>
+      <p15:sldGuideLst xmlns="" xmlns:p15="http://schemas.microsoft.com/office/powerpoint/2012/main"/>
     </p:ext>
   </p:extLst>
 </p:sldLayout>
@@ -5285,7 +5285,7 @@
           <a:p>
             <a:fld id="{FF632088-7E42-4B13-8645-6CA4616862AF}" type="datetimeFigureOut">
               <a:rPr lang="en-US" smtClean="0"/>
-              <a:t>3/2/2016</a:t>
+              <a:t>3/3/2016</a:t>
             </a:fld>
             <a:endParaRPr lang="en-US"/>
           </a:p>
@@ -5499,7 +5499,7 @@
           <a:p>
             <a:fld id="{FF632088-7E42-4B13-8645-6CA4616862AF}" type="datetimeFigureOut">
               <a:rPr lang="en-US" smtClean="0"/>
-              <a:t>3/2/2016</a:t>
+              <a:t>3/3/2016</a:t>
             </a:fld>
             <a:endParaRPr lang="en-US"/>
           </a:p>
@@ -5875,7 +5875,7 @@
   </p:txStyles>
   <p:extLst>
     <p:ext uri="{27BBF7A9-308A-43DC-89C8-2F10F3537804}">
-      <p15:sldGuideLst xmlns:p15="http://schemas.microsoft.com/office/powerpoint/2012/main" xmlns=""/>
+      <p15:sldGuideLst xmlns="" xmlns:p15="http://schemas.microsoft.com/office/powerpoint/2012/main"/>
     </p:ext>
   </p:extLst>
 </p:sldMaster>
@@ -6104,7 +6104,7 @@
           <a:p>
             <a:fld id="{FF632088-7E42-4B13-8645-6CA4616862AF}" type="datetimeFigureOut">
               <a:rPr lang="en-US" smtClean="0"/>
-              <a:t>3/2/2016</a:t>
+              <a:t>3/3/2016</a:t>
             </a:fld>
             <a:endParaRPr lang="en-US"/>
           </a:p>
@@ -6572,7 +6572,7 @@
   </p:txStyles>
   <p:extLst>
     <p:ext uri="{27BBF7A9-308A-43DC-89C8-2F10F3537804}">
-      <p15:sldGuideLst xmlns:p15="http://schemas.microsoft.com/office/powerpoint/2012/main" xmlns=""/>
+      <p15:sldGuideLst xmlns="" xmlns:p15="http://schemas.microsoft.com/office/powerpoint/2012/main"/>
     </p:ext>
   </p:extLst>
 </p:sldMaster>
@@ -6709,7 +6709,33 @@
           <a:bodyPr/>
           <a:lstStyle/>
           <a:p>
+            <a:r>
+              <a:rPr lang="en-US" dirty="0"/>
+              <a:t>These hospitals provide emergency care services in rural </a:t>
+            </a:r>
+            <a:r>
+              <a:rPr lang="en-US" dirty="0" smtClean="0"/>
+              <a:t>communities (more than 35 miles from another hospital).</a:t>
+            </a:r>
             <a:endParaRPr lang="en-US" dirty="0"/>
+          </a:p>
+          <a:p>
+            <a:r>
+              <a:rPr lang="en-US" dirty="0" smtClean="0"/>
+              <a:t>Critical access hospitals are small facilities (less than 25 beds).</a:t>
+            </a:r>
+          </a:p>
+          <a:p>
+            <a:r>
+              <a:rPr lang="en-US" dirty="0" smtClean="0"/>
+              <a:t>They are designed to provide short-term care (less than 96 hours) for common illnesses and injuries.</a:t>
+            </a:r>
+          </a:p>
+          <a:p>
+            <a:r>
+              <a:rPr lang="en-US" dirty="0" smtClean="0"/>
+              <a:t>They also triage more complex cases, which are referred to larger facilities.</a:t>
+            </a:r>
           </a:p>
         </p:txBody>
       </p:sp>
@@ -6778,7 +6804,9 @@
         </p:nvSpPr>
         <p:spPr/>
         <p:txBody>
-          <a:bodyPr/>
+          <a:bodyPr>
+            <a:normAutofit lnSpcReduction="10000"/>
+          </a:bodyPr>
           <a:lstStyle/>
           <a:p>
             <a:r>
@@ -6837,6 +6865,36 @@
                 <a:hlinkClick r:id="rId5"/>
               </a:rPr>
               <a:t>www.hrsa.gov/healthit/toolbox/RuralHealthITtoolbox/Introduction/critical.html</a:t>
+            </a:r>
+            <a:endParaRPr lang="en-US" dirty="0" smtClean="0"/>
+          </a:p>
+          <a:p>
+            <a:r>
+              <a:rPr lang="en-US" dirty="0">
+                <a:hlinkClick r:id="rId6"/>
+              </a:rPr>
+              <a:t>https://</a:t>
+            </a:r>
+            <a:r>
+              <a:rPr lang="en-US" dirty="0" smtClean="0">
+                <a:hlinkClick r:id="rId6"/>
+              </a:rPr>
+              <a:t>en.wikipedia.org/wiki/Acute_care</a:t>
+            </a:r>
+            <a:endParaRPr lang="en-US" dirty="0" smtClean="0"/>
+          </a:p>
+          <a:p>
+            <a:r>
+              <a:rPr lang="en-US" dirty="0">
+                <a:hlinkClick r:id="rId7"/>
+              </a:rPr>
+              <a:t>https://</a:t>
+            </a:r>
+            <a:r>
+              <a:rPr lang="en-US" dirty="0" smtClean="0">
+                <a:hlinkClick r:id="rId7"/>
+              </a:rPr>
+              <a:t>www.cms.gov/Medicare/Provider-Enrollment-and-Certification/CertificationandComplianc/InpatientRehab.html</a:t>
             </a:r>
             <a:endParaRPr lang="en-US" dirty="0" smtClean="0"/>
           </a:p>
@@ -6913,6 +6971,24 @@
           <a:bodyPr/>
           <a:lstStyle/>
           <a:p>
+            <a:r>
+              <a:rPr lang="en-US" dirty="0" smtClean="0"/>
+              <a:t>Acute Care Facilities treat acute conditions, including injuries, illnesses and other urgent medical conditions.</a:t>
+            </a:r>
+          </a:p>
+          <a:p>
+            <a:r>
+              <a:rPr lang="en-US" dirty="0" smtClean="0"/>
+              <a:t>Acute care Facilities include “</a:t>
+            </a:r>
+            <a:r>
+              <a:rPr lang="en-US" dirty="0"/>
+              <a:t>emergency department, intensive care, coronary care, cardiology, neonatal intensive care, and many general areas where the patient could become acutely unwell and require </a:t>
+            </a:r>
+            <a:r>
+              <a:rPr lang="en-US" dirty="0" smtClean="0"/>
+              <a:t>stabilization”</a:t>
+            </a:r>
             <a:endParaRPr lang="en-US" dirty="0"/>
           </a:p>
         </p:txBody>
@@ -6987,7 +7063,23 @@
           <a:p>
             <a:r>
               <a:rPr lang="en-US" dirty="0" smtClean="0"/>
-              <a:t>A skilled nursing facility is designed to provide long term care.</a:t>
+              <a:t>A skilled nursing facility is designed to provide long term care</a:t>
+            </a:r>
+            <a:r>
+              <a:rPr lang="en-US" dirty="0" smtClean="0"/>
+              <a:t>.</a:t>
+            </a:r>
+          </a:p>
+          <a:p>
+            <a:r>
+              <a:rPr lang="en-US" dirty="0" smtClean="0"/>
+              <a:t>These facilities primarily treat elderly and disabled patients.</a:t>
+            </a:r>
+          </a:p>
+          <a:p>
+            <a:r>
+              <a:rPr lang="en-US" dirty="0" smtClean="0"/>
+              <a:t>These facilities are designed for patients who require a level of care that must be provided by a doctor or a registered nurse.</a:t>
             </a:r>
             <a:endParaRPr lang="en-US" dirty="0"/>
           </a:p>
@@ -7061,6 +7153,22 @@
           <a:bodyPr/>
           <a:lstStyle/>
           <a:p>
+            <a:r>
+              <a:rPr lang="en-US" dirty="0" smtClean="0"/>
+              <a:t>Intermediate Care Facilities are a Medicaid-funded facility designed for individuals with intellectual disabilities.</a:t>
+            </a:r>
+          </a:p>
+          <a:p>
+            <a:r>
+              <a:rPr lang="en-US" dirty="0" smtClean="0"/>
+              <a:t>These facilities provide comprehensive care, including health care services and nutrition.</a:t>
+            </a:r>
+          </a:p>
+          <a:p>
+            <a:r>
+              <a:rPr lang="en-US" dirty="0" smtClean="0"/>
+              <a:t>Many of these facilities are “Day Programs”, which allow patients to work in the community.</a:t>
+            </a:r>
             <a:endParaRPr lang="en-US" dirty="0"/>
           </a:p>
         </p:txBody>
@@ -7133,6 +7241,18 @@
           <a:bodyPr/>
           <a:lstStyle/>
           <a:p>
+            <a:r>
+              <a:rPr lang="en-US" dirty="0" smtClean="0"/>
+              <a:t>Hospice facilities specialize in providing end-of-life care.</a:t>
+            </a:r>
+          </a:p>
+          <a:p>
+            <a:r>
+              <a:rPr lang="en-US" dirty="0" smtClean="0"/>
+              <a:t>Hospice services can be inpatient or provided in the patient’s home.</a:t>
+            </a:r>
+          </a:p>
+          <a:p>
             <a:endParaRPr lang="en-US" dirty="0"/>
           </a:p>
         </p:txBody>
@@ -7205,6 +7325,22 @@
           <a:bodyPr/>
           <a:lstStyle/>
           <a:p>
+            <a:r>
+              <a:rPr lang="en-US" dirty="0" smtClean="0"/>
+              <a:t>The National Cancer Institute has designated 69 facilities as cancer centers</a:t>
+            </a:r>
+          </a:p>
+          <a:p>
+            <a:r>
+              <a:rPr lang="en-US" dirty="0" smtClean="0"/>
+              <a:t>Cancer centers provide cutting edge treatments for cancer and related illnesses.</a:t>
+            </a:r>
+          </a:p>
+          <a:p>
+            <a:r>
+              <a:rPr lang="en-US" dirty="0" smtClean="0"/>
+              <a:t>These facilities also conduct cancer research and train cancer specialists.</a:t>
+            </a:r>
             <a:endParaRPr lang="en-US" dirty="0"/>
           </a:p>
         </p:txBody>
@@ -7277,6 +7413,10 @@
           <a:bodyPr/>
           <a:lstStyle/>
           <a:p>
+            <a:r>
+              <a:rPr lang="en-US" dirty="0" smtClean="0"/>
+              <a:t>An inpatient facility specializing in pediatric care.</a:t>
+            </a:r>
             <a:endParaRPr lang="en-US" dirty="0"/>
           </a:p>
         </p:txBody>
@@ -7349,6 +7489,16 @@
           <a:bodyPr/>
           <a:lstStyle/>
           <a:p>
+            <a:r>
+              <a:rPr lang="en-US" dirty="0" smtClean="0"/>
+              <a:t>Provide inpatient care and rehabilitation services.</a:t>
+            </a:r>
+          </a:p>
+          <a:p>
+            <a:r>
+              <a:rPr lang="en-US" dirty="0" smtClean="0"/>
+              <a:t>Designed for patient able to participate in at least three hours of intense rehabilitation service per day.</a:t>
+            </a:r>
             <a:endParaRPr lang="en-US" dirty="0"/>
           </a:p>
         </p:txBody>
@@ -7420,6 +7570,12 @@
         <p:txBody>
           <a:bodyPr/>
           <a:lstStyle/>
+          <a:p>
+            <a:r>
+              <a:rPr lang="en-US" dirty="0" smtClean="0"/>
+              <a:t>An inpatient facility specializing in the treatment of mental health illnesses.</a:t>
+            </a:r>
+          </a:p>
           <a:p>
             <a:endParaRPr lang="en-US" dirty="0"/>
           </a:p>
@@ -7938,7 +8094,7 @@
   <a:extraClrSchemeLst/>
   <a:extLst>
     <a:ext uri="{05A4C25C-085E-4340-85A3-A5531E510DB2}">
-      <thm15:themeFamily xmlns:thm15="http://schemas.microsoft.com/office/thememl/2012/main" xmlns="" name="Gallery" id="{BBFCD31E-59A1-489D-B089-A3EAD7CAE12E}" vid="{AC464412-510E-4F2B-8947-A0DDBD028997}"/>
+      <thm15:themeFamily xmlns="" xmlns:thm15="http://schemas.microsoft.com/office/thememl/2012/main" name="Gallery" id="{BBFCD31E-59A1-489D-B089-A3EAD7CAE12E}" vid="{AC464412-510E-4F2B-8947-A0DDBD028997}"/>
     </a:ext>
   </a:extLst>
 </a:theme>

</xml_diff>